<commit_message>
dates, some code, ppts
</commit_message>
<xml_diff>
--- a/powerpoint/Session1.pptx
+++ b/powerpoint/Session1.pptx
@@ -2751,10 +2751,10 @@
         <a:lstStyle/>
         <a:p>
           <a:r>
-            <a:rPr lang="en-GB" b="0"/>
-            <a:t>Constants are unchanging</a:t>
+            <a:rPr lang="en-GB" b="0" dirty="0"/>
+            <a:t>Some constants are built-in</a:t>
           </a:r>
-          <a:endParaRPr lang="en-US"/>
+          <a:endParaRPr lang="en-US" dirty="0"/>
         </a:p>
       </dgm:t>
     </dgm:pt>
@@ -2792,7 +2792,7 @@
           </a:pPr>
           <a:r>
             <a:rPr lang="en-GB" dirty="0"/>
-            <a:t>Pi, Avogadro’s number</a:t>
+            <a:t>Pi, LETTERS</a:t>
           </a:r>
           <a:endParaRPr lang="en-US" dirty="0"/>
         </a:p>
@@ -2828,10 +2828,16 @@
         <a:lstStyle/>
         <a:p>
           <a:r>
-            <a:rPr lang="en-GB" b="0"/>
+            <a:rPr lang="en-GB" b="0" dirty="0"/>
             <a:t>Variables are placeholders</a:t>
           </a:r>
-          <a:endParaRPr lang="en-US"/>
+        </a:p>
+        <a:p>
+          <a:r>
+            <a:rPr lang="en-GB" b="0" dirty="0"/>
+            <a:t>(created by users)</a:t>
+          </a:r>
+          <a:endParaRPr lang="en-US" dirty="0"/>
         </a:p>
       </dgm:t>
     </dgm:pt>
@@ -3537,7 +3543,7 @@
           </a:pPr>
           <a:r>
             <a:rPr lang="en-GB" sz="3600" kern="1200" dirty="0"/>
-            <a:t>Pi, Avogadro’s number</a:t>
+            <a:t>Pi, LETTERS</a:t>
           </a:r>
           <a:endParaRPr lang="en-US" sz="3600" kern="1200" dirty="0"/>
         </a:p>
@@ -3615,10 +3621,10 @@
             <a:buNone/>
           </a:pPr>
           <a:r>
-            <a:rPr lang="en-GB" sz="2000" b="0" kern="1200"/>
-            <a:t>Constants are unchanging</a:t>
+            <a:rPr lang="en-GB" sz="2000" b="0" kern="1200" dirty="0"/>
+            <a:t>Some constants are built-in</a:t>
           </a:r>
-          <a:endParaRPr lang="en-US" sz="2000" kern="1200"/>
+          <a:endParaRPr lang="en-US" sz="2000" kern="1200" dirty="0"/>
         </a:p>
       </dsp:txBody>
       <dsp:txXfrm>
@@ -3775,10 +3781,28 @@
             <a:buNone/>
           </a:pPr>
           <a:r>
-            <a:rPr lang="en-GB" sz="2000" b="0" kern="1200"/>
+            <a:rPr lang="en-GB" sz="2000" b="0" kern="1200" dirty="0"/>
             <a:t>Variables are placeholders</a:t>
           </a:r>
-          <a:endParaRPr lang="en-US" sz="2000" kern="1200"/>
+        </a:p>
+        <a:p>
+          <a:pPr marL="0" lvl="0" indent="0" algn="ctr" defTabSz="889000">
+            <a:lnSpc>
+              <a:spcPct val="90000"/>
+            </a:lnSpc>
+            <a:spcBef>
+              <a:spcPct val="0"/>
+            </a:spcBef>
+            <a:spcAft>
+              <a:spcPct val="35000"/>
+            </a:spcAft>
+            <a:buNone/>
+          </a:pPr>
+          <a:r>
+            <a:rPr lang="en-GB" sz="2000" b="0" kern="1200" dirty="0"/>
+            <a:t>(created by users)</a:t>
+          </a:r>
+          <a:endParaRPr lang="en-US" sz="2000" kern="1200" dirty="0"/>
         </a:p>
       </dsp:txBody>
       <dsp:txXfrm>
@@ -38415,7 +38439,7 @@
                 <a:latin typeface="Calibri"/>
                 <a:ea typeface="DejaVu Sans"/>
               </a:rPr>
-              <a:t>GitHub account</a:t>
+              <a:t>GitHub account (optional)</a:t>
             </a:r>
           </a:p>
           <a:p>
@@ -38446,16 +38470,16 @@
               <a:t>GitHub repository </a:t>
             </a:r>
             <a:r>
-              <a:rPr lang="en-US" sz="2400" spc="-1" dirty="0">
+              <a:rPr lang="en-US" sz="3600" spc="-1" dirty="0">
                 <a:solidFill>
                   <a:srgbClr val="000000"/>
                 </a:solidFill>
                 <a:latin typeface="Calibri"/>
                 <a:hlinkClick r:id="rId2"/>
               </a:rPr>
-              <a:t>https://github.com/sraorao/MSD_R_course_MT2022</a:t>
+              <a:t>https://github.com/sraorao/MSD_R_course_Nov2022</a:t>
             </a:r>
-            <a:endParaRPr lang="en-US" sz="2400" spc="-1" dirty="0">
+            <a:endParaRPr lang="en-US" sz="3600" spc="-1" dirty="0">
               <a:solidFill>
                 <a:srgbClr val="000000"/>
               </a:solidFill>
@@ -44386,7 +44410,7 @@
           <p:nvPr>
             <p:extLst>
               <p:ext uri="{D42A27DB-BD31-4B8C-83A1-F6EECF244321}">
-                <p14:modId xmlns:p14="http://schemas.microsoft.com/office/powerpoint/2010/main" val="1899446945"/>
+                <p14:modId xmlns:p14="http://schemas.microsoft.com/office/powerpoint/2010/main" val="2032563797"/>
               </p:ext>
             </p:extLst>
           </p:nvPr>

</xml_diff>

<commit_message>
update slides, dates, code
</commit_message>
<xml_diff>
--- a/powerpoint/Session1.pptx
+++ b/powerpoint/Session1.pptx
@@ -23,19 +23,20 @@
     <p:sldId id="282" r:id="rId17"/>
     <p:sldId id="265" r:id="rId18"/>
     <p:sldId id="266" r:id="rId19"/>
-    <p:sldId id="267" r:id="rId20"/>
-    <p:sldId id="268" r:id="rId21"/>
-    <p:sldId id="269" r:id="rId22"/>
-    <p:sldId id="270" r:id="rId23"/>
-    <p:sldId id="271" r:id="rId24"/>
-    <p:sldId id="272" r:id="rId25"/>
-    <p:sldId id="273" r:id="rId26"/>
-    <p:sldId id="274" r:id="rId27"/>
-    <p:sldId id="275" r:id="rId28"/>
-    <p:sldId id="277" r:id="rId29"/>
-    <p:sldId id="278" r:id="rId30"/>
-    <p:sldId id="280" r:id="rId31"/>
-    <p:sldId id="281" r:id="rId32"/>
+    <p:sldId id="283" r:id="rId20"/>
+    <p:sldId id="267" r:id="rId21"/>
+    <p:sldId id="268" r:id="rId22"/>
+    <p:sldId id="269" r:id="rId23"/>
+    <p:sldId id="270" r:id="rId24"/>
+    <p:sldId id="271" r:id="rId25"/>
+    <p:sldId id="272" r:id="rId26"/>
+    <p:sldId id="273" r:id="rId27"/>
+    <p:sldId id="274" r:id="rId28"/>
+    <p:sldId id="275" r:id="rId29"/>
+    <p:sldId id="277" r:id="rId30"/>
+    <p:sldId id="278" r:id="rId31"/>
+    <p:sldId id="280" r:id="rId32"/>
+    <p:sldId id="281" r:id="rId33"/>
   </p:sldIdLst>
   <p:sldSz cx="9144000" cy="6858000" type="screen4x3"/>
   <p:notesSz cx="7559675" cy="10691813"/>
@@ -24303,6 +24304,562 @@
       </p:grpSpPr>
       <p:sp>
         <p:nvSpPr>
+          <p:cNvPr id="406" name="TextShape 1"/>
+          <p:cNvSpPr txBox="1"/>
+          <p:nvPr/>
+        </p:nvSpPr>
+        <p:spPr>
+          <a:xfrm>
+            <a:off x="457200" y="274680"/>
+            <a:ext cx="8229240" cy="1142640"/>
+          </a:xfrm>
+          <a:prstGeom prst="rect">
+            <a:avLst/>
+          </a:prstGeom>
+          <a:noFill/>
+          <a:ln>
+            <a:noFill/>
+          </a:ln>
+        </p:spPr>
+        <p:txBody>
+          <a:bodyPr anchor="ctr">
+            <a:noAutofit/>
+          </a:bodyPr>
+          <a:lstStyle/>
+          <a:p>
+            <a:pPr algn="ctr">
+              <a:lnSpc>
+                <a:spcPct val="100000"/>
+              </a:lnSpc>
+            </a:pPr>
+            <a:r>
+              <a:rPr lang="en-GB" sz="4400" b="1" strike="noStrike" spc="-1">
+                <a:solidFill>
+                  <a:srgbClr val="000000"/>
+                </a:solidFill>
+                <a:latin typeface="Calibri"/>
+              </a:rPr>
+              <a:t>Reading data into R</a:t>
+            </a:r>
+            <a:endParaRPr lang="en-US" sz="4400" b="0" strike="noStrike" spc="-1">
+              <a:solidFill>
+                <a:srgbClr val="000000"/>
+              </a:solidFill>
+              <a:latin typeface="Calibri"/>
+            </a:endParaRPr>
+          </a:p>
+        </p:txBody>
+      </p:sp>
+      <p:pic>
+        <p:nvPicPr>
+          <p:cNvPr id="407" name="Picture 7_1" descr="A picture containing logo&#10;&#10;Description automatically generated"/>
+          <p:cNvPicPr/>
+          <p:nvPr/>
+        </p:nvPicPr>
+        <p:blipFill>
+          <a:blip r:embed="rId2"/>
+          <a:stretch/>
+        </p:blipFill>
+        <p:spPr>
+          <a:xfrm>
+            <a:off x="2432160" y="1274040"/>
+            <a:ext cx="3809520" cy="1952280"/>
+          </a:xfrm>
+          <a:prstGeom prst="rect">
+            <a:avLst/>
+          </a:prstGeom>
+          <a:ln>
+            <a:noFill/>
+          </a:ln>
+        </p:spPr>
+      </p:pic>
+      <p:sp>
+        <p:nvSpPr>
+          <p:cNvPr id="408" name="CustomShape 2"/>
+          <p:cNvSpPr/>
+          <p:nvPr/>
+        </p:nvSpPr>
+        <p:spPr>
+          <a:xfrm>
+            <a:off x="4969800" y="2785320"/>
+            <a:ext cx="1615320" cy="366120"/>
+          </a:xfrm>
+          <a:prstGeom prst="rect">
+            <a:avLst/>
+          </a:prstGeom>
+          <a:noFill/>
+          <a:ln>
+            <a:noFill/>
+          </a:ln>
+        </p:spPr>
+        <p:style>
+          <a:lnRef idx="0">
+            <a:scrgbClr r="0" g="0" b="0"/>
+          </a:lnRef>
+          <a:fillRef idx="0">
+            <a:scrgbClr r="0" g="0" b="0"/>
+          </a:fillRef>
+          <a:effectRef idx="0">
+            <a:scrgbClr r="0" g="0" b="0"/>
+          </a:effectRef>
+          <a:fontRef idx="minor"/>
+        </p:style>
+        <p:txBody>
+          <a:bodyPr>
+            <a:spAutoFit/>
+          </a:bodyPr>
+          <a:lstStyle/>
+          <a:p>
+            <a:pPr>
+              <a:lnSpc>
+                <a:spcPct val="100000"/>
+              </a:lnSpc>
+            </a:pPr>
+            <a:r>
+              <a:rPr lang="en-GB" sz="1800" b="0" strike="noStrike" spc="-1">
+                <a:solidFill>
+                  <a:srgbClr val="000000"/>
+                </a:solidFill>
+                <a:latin typeface="Calibri"/>
+              </a:rPr>
+              <a:t>xls, xlsx files</a:t>
+            </a:r>
+            <a:endParaRPr lang="en-GB" sz="1800" b="0" strike="noStrike" spc="-1">
+              <a:latin typeface="Arial"/>
+            </a:endParaRPr>
+          </a:p>
+        </p:txBody>
+      </p:sp>
+      <p:sp>
+        <p:nvSpPr>
+          <p:cNvPr id="409" name="CustomShape 3"/>
+          <p:cNvSpPr/>
+          <p:nvPr/>
+        </p:nvSpPr>
+        <p:spPr>
+          <a:xfrm>
+            <a:off x="585720" y="3427560"/>
+            <a:ext cx="5999760" cy="640440"/>
+          </a:xfrm>
+          <a:prstGeom prst="rect">
+            <a:avLst/>
+          </a:prstGeom>
+          <a:noFill/>
+          <a:ln>
+            <a:noFill/>
+          </a:ln>
+        </p:spPr>
+        <p:style>
+          <a:lnRef idx="0">
+            <a:scrgbClr r="0" g="0" b="0"/>
+          </a:lnRef>
+          <a:fillRef idx="0">
+            <a:scrgbClr r="0" g="0" b="0"/>
+          </a:fillRef>
+          <a:effectRef idx="0">
+            <a:scrgbClr r="0" g="0" b="0"/>
+          </a:effectRef>
+          <a:fontRef idx="minor"/>
+        </p:style>
+        <p:txBody>
+          <a:bodyPr>
+            <a:spAutoFit/>
+          </a:bodyPr>
+          <a:lstStyle/>
+          <a:p>
+            <a:pPr>
+              <a:lnSpc>
+                <a:spcPct val="100000"/>
+              </a:lnSpc>
+            </a:pPr>
+            <a:r>
+              <a:rPr lang="en-GB" sz="1800" b="0" strike="noStrike" spc="-1">
+                <a:solidFill>
+                  <a:srgbClr val="000000"/>
+                </a:solidFill>
+                <a:latin typeface="Courier New"/>
+                <a:ea typeface="Calibri"/>
+              </a:rPr>
+              <a:t>install.packages("readxl") </a:t>
+            </a:r>
+            <a:r>
+              <a:rPr lang="en-GB" sz="1800" b="0" strike="noStrike" spc="-1">
+                <a:solidFill>
+                  <a:srgbClr val="000000"/>
+                </a:solidFill>
+                <a:latin typeface="Calibri"/>
+                <a:ea typeface="Calibri"/>
+              </a:rPr>
+              <a:t>- install the package</a:t>
+            </a:r>
+            <a:endParaRPr lang="en-GB" sz="1800" b="0" strike="noStrike" spc="-1">
+              <a:latin typeface="Arial"/>
+            </a:endParaRPr>
+          </a:p>
+          <a:p>
+            <a:pPr>
+              <a:lnSpc>
+                <a:spcPct val="100000"/>
+              </a:lnSpc>
+            </a:pPr>
+            <a:r>
+              <a:rPr lang="en-GB" sz="1800" b="0" strike="noStrike" spc="-1">
+                <a:solidFill>
+                  <a:srgbClr val="000000"/>
+                </a:solidFill>
+                <a:latin typeface="Courier New"/>
+                <a:ea typeface="Calibri"/>
+              </a:rPr>
+              <a:t>library(readxl)</a:t>
+            </a:r>
+            <a:r>
+              <a:rPr lang="en-GB" sz="1800" b="0" strike="noStrike" spc="-1">
+                <a:solidFill>
+                  <a:srgbClr val="000000"/>
+                </a:solidFill>
+                <a:latin typeface="Calibri"/>
+                <a:ea typeface="Calibri"/>
+              </a:rPr>
+              <a:t> - load the package</a:t>
+            </a:r>
+            <a:endParaRPr lang="en-GB" sz="1800" b="0" strike="noStrike" spc="-1">
+              <a:latin typeface="Arial"/>
+            </a:endParaRPr>
+          </a:p>
+        </p:txBody>
+      </p:sp>
+      <p:sp>
+        <p:nvSpPr>
+          <p:cNvPr id="410" name="CustomShape 4"/>
+          <p:cNvSpPr/>
+          <p:nvPr/>
+        </p:nvSpPr>
+        <p:spPr>
+          <a:xfrm>
+            <a:off x="4689720" y="5934600"/>
+            <a:ext cx="4293000" cy="640440"/>
+          </a:xfrm>
+          <a:prstGeom prst="rect">
+            <a:avLst/>
+          </a:prstGeom>
+          <a:noFill/>
+          <a:ln>
+            <a:noFill/>
+          </a:ln>
+        </p:spPr>
+        <p:style>
+          <a:lnRef idx="0">
+            <a:scrgbClr r="0" g="0" b="0"/>
+          </a:lnRef>
+          <a:fillRef idx="0">
+            <a:scrgbClr r="0" g="0" b="0"/>
+          </a:fillRef>
+          <a:effectRef idx="0">
+            <a:scrgbClr r="0" g="0" b="0"/>
+          </a:effectRef>
+          <a:fontRef idx="minor"/>
+        </p:style>
+        <p:txBody>
+          <a:bodyPr>
+            <a:spAutoFit/>
+          </a:bodyPr>
+          <a:lstStyle/>
+          <a:p>
+            <a:pPr algn="r">
+              <a:lnSpc>
+                <a:spcPct val="100000"/>
+              </a:lnSpc>
+            </a:pPr>
+            <a:r>
+              <a:rPr lang="en-GB" sz="1800" b="0" u="sng" strike="noStrike" spc="-1">
+                <a:solidFill>
+                  <a:srgbClr val="0000FF"/>
+                </a:solidFill>
+                <a:uFillTx/>
+                <a:latin typeface="Calibri"/>
+                <a:ea typeface="Calibri"/>
+                <a:hlinkClick r:id="rId3"/>
+              </a:rPr>
+              <a:t>https://www.rdocumentation.org</a:t>
+            </a:r>
+            <a:endParaRPr lang="en-GB" sz="1800" b="0" strike="noStrike" spc="-1">
+              <a:latin typeface="Arial"/>
+            </a:endParaRPr>
+          </a:p>
+          <a:p>
+            <a:pPr algn="r">
+              <a:lnSpc>
+                <a:spcPct val="100000"/>
+              </a:lnSpc>
+            </a:pPr>
+            <a:r>
+              <a:rPr lang="en-GB" sz="1800" b="0" strike="noStrike" spc="-1">
+                <a:solidFill>
+                  <a:srgbClr val="000000"/>
+                </a:solidFill>
+                <a:latin typeface="Calibri"/>
+                <a:ea typeface="Calibri"/>
+              </a:rPr>
+              <a:t>More examples (over 21 000 packages)</a:t>
+            </a:r>
+            <a:endParaRPr lang="en-GB" sz="1800" b="0" strike="noStrike" spc="-1">
+              <a:latin typeface="Arial"/>
+            </a:endParaRPr>
+          </a:p>
+        </p:txBody>
+      </p:sp>
+      <p:sp>
+        <p:nvSpPr>
+          <p:cNvPr id="411" name="CustomShape 5"/>
+          <p:cNvSpPr/>
+          <p:nvPr/>
+        </p:nvSpPr>
+        <p:spPr>
+          <a:xfrm>
+            <a:off x="2520" y="4268880"/>
+            <a:ext cx="9123120" cy="1737720"/>
+          </a:xfrm>
+          <a:prstGeom prst="rect">
+            <a:avLst/>
+          </a:prstGeom>
+          <a:noFill/>
+          <a:ln>
+            <a:noFill/>
+          </a:ln>
+        </p:spPr>
+        <p:style>
+          <a:lnRef idx="0">
+            <a:scrgbClr r="0" g="0" b="0"/>
+          </a:lnRef>
+          <a:fillRef idx="0">
+            <a:scrgbClr r="0" g="0" b="0"/>
+          </a:fillRef>
+          <a:effectRef idx="0">
+            <a:scrgbClr r="0" g="0" b="0"/>
+          </a:effectRef>
+          <a:fontRef idx="minor"/>
+        </p:style>
+        <p:txBody>
+          <a:bodyPr>
+            <a:spAutoFit/>
+          </a:bodyPr>
+          <a:lstStyle/>
+          <a:p>
+            <a:pPr marL="285840" indent="-285480">
+              <a:lnSpc>
+                <a:spcPct val="100000"/>
+              </a:lnSpc>
+              <a:buClr>
+                <a:srgbClr val="000000"/>
+              </a:buClr>
+              <a:buFont typeface="Arial"/>
+              <a:buChar char="•"/>
+            </a:pPr>
+            <a:r>
+              <a:rPr lang="en-US" sz="1800" b="1" strike="noStrike" spc="-1">
+                <a:solidFill>
+                  <a:srgbClr val="000000"/>
+                </a:solidFill>
+                <a:latin typeface="Courier New"/>
+                <a:ea typeface="Calibri"/>
+              </a:rPr>
+              <a:t>read_excel</a:t>
+            </a:r>
+            <a:r>
+              <a:rPr lang="en-US" sz="1800" b="0" strike="noStrike" spc="-1">
+                <a:solidFill>
+                  <a:srgbClr val="000000"/>
+                </a:solidFill>
+                <a:latin typeface="Courier New"/>
+                <a:ea typeface="Calibri"/>
+              </a:rPr>
+              <a:t>(</a:t>
+            </a:r>
+            <a:r>
+              <a:rPr lang="en-US" sz="1800" b="0" strike="noStrike" spc="-1">
+                <a:solidFill>
+                  <a:srgbClr val="000000"/>
+                </a:solidFill>
+                <a:highlight>
+                  <a:srgbClr val="FFFF00"/>
+                </a:highlight>
+                <a:latin typeface="Courier New"/>
+                <a:ea typeface="Calibri"/>
+              </a:rPr>
+              <a:t>path, sheet = NULL, range = NULL, col_names = TRUE, col_types = NULL, na = "", trim_ws = TRUE, ...)</a:t>
+            </a:r>
+            <a:endParaRPr lang="en-GB" sz="1800" b="0" strike="noStrike" spc="-1">
+              <a:latin typeface="Arial"/>
+            </a:endParaRPr>
+          </a:p>
+          <a:p>
+            <a:pPr marL="285840" indent="-285480">
+              <a:lnSpc>
+                <a:spcPct val="100000"/>
+              </a:lnSpc>
+              <a:buClr>
+                <a:srgbClr val="000000"/>
+              </a:buClr>
+              <a:buFont typeface="Arial"/>
+              <a:buChar char="•"/>
+            </a:pPr>
+            <a:r>
+              <a:rPr lang="en-GB" sz="1800" b="1" strike="noStrike" spc="-1">
+                <a:solidFill>
+                  <a:srgbClr val="000000"/>
+                </a:solidFill>
+                <a:highlight>
+                  <a:srgbClr val="FFFF00"/>
+                </a:highlight>
+                <a:latin typeface="Courier New"/>
+                <a:ea typeface="Calibri"/>
+              </a:rPr>
+              <a:t>read_xls</a:t>
+            </a:r>
+            <a:r>
+              <a:rPr lang="en-GB" sz="1800" b="0" strike="noStrike" spc="-1">
+                <a:solidFill>
+                  <a:srgbClr val="000000"/>
+                </a:solidFill>
+                <a:highlight>
+                  <a:srgbClr val="FFFF00"/>
+                </a:highlight>
+                <a:latin typeface="Courier New"/>
+                <a:ea typeface="Calibri"/>
+              </a:rPr>
+              <a:t>(path, sheet = NULL, range = NULL, col_names = TRUE, col_types = NULL, na = "", trim_ws = TRUE, ...)</a:t>
+            </a:r>
+            <a:endParaRPr lang="en-GB" sz="1800" b="0" strike="noStrike" spc="-1">
+              <a:latin typeface="Arial"/>
+            </a:endParaRPr>
+          </a:p>
+          <a:p>
+            <a:pPr marL="285840" indent="-285480">
+              <a:lnSpc>
+                <a:spcPct val="100000"/>
+              </a:lnSpc>
+              <a:buClr>
+                <a:srgbClr val="000000"/>
+              </a:buClr>
+              <a:buFont typeface="Arial"/>
+              <a:buChar char="•"/>
+            </a:pPr>
+            <a:r>
+              <a:rPr lang="en-GB" sz="1800" b="1" strike="noStrike" spc="-1">
+                <a:solidFill>
+                  <a:srgbClr val="000000"/>
+                </a:solidFill>
+                <a:highlight>
+                  <a:srgbClr val="FFFF00"/>
+                </a:highlight>
+                <a:latin typeface="Courier New"/>
+                <a:ea typeface="Calibri"/>
+              </a:rPr>
+              <a:t>read_xlsx</a:t>
+            </a:r>
+            <a:r>
+              <a:rPr lang="en-GB" sz="1800" b="0" strike="noStrike" spc="-1">
+                <a:solidFill>
+                  <a:srgbClr val="000000"/>
+                </a:solidFill>
+                <a:highlight>
+                  <a:srgbClr val="FFFF00"/>
+                </a:highlight>
+                <a:latin typeface="Courier New"/>
+                <a:ea typeface="Calibri"/>
+              </a:rPr>
+              <a:t>(path, sheet = NULL, range = NULL, col_names = TRUE, col_types = NULL, na = "", trim_ws = TRUE, ...)</a:t>
+            </a:r>
+            <a:endParaRPr lang="en-GB" sz="1800" b="0" strike="noStrike" spc="-1">
+              <a:latin typeface="Arial"/>
+            </a:endParaRPr>
+          </a:p>
+        </p:txBody>
+      </p:sp>
+      <p:sp>
+        <p:nvSpPr>
+          <p:cNvPr id="412" name="CustomShape 6"/>
+          <p:cNvSpPr/>
+          <p:nvPr/>
+        </p:nvSpPr>
+        <p:spPr>
+          <a:xfrm>
+            <a:off x="6478200" y="3461760"/>
+            <a:ext cx="2451960" cy="364680"/>
+          </a:xfrm>
+          <a:prstGeom prst="rect">
+            <a:avLst/>
+          </a:prstGeom>
+          <a:noFill/>
+          <a:ln>
+            <a:noFill/>
+          </a:ln>
+        </p:spPr>
+        <p:style>
+          <a:lnRef idx="0">
+            <a:scrgbClr r="0" g="0" b="0"/>
+          </a:lnRef>
+          <a:fillRef idx="0">
+            <a:scrgbClr r="0" g="0" b="0"/>
+          </a:fillRef>
+          <a:effectRef idx="0">
+            <a:scrgbClr r="0" g="0" b="0"/>
+          </a:effectRef>
+          <a:fontRef idx="minor"/>
+        </p:style>
+        <p:txBody>
+          <a:bodyPr wrap="none" lIns="90000" tIns="45000" rIns="90000" bIns="45000">
+            <a:spAutoFit/>
+          </a:bodyPr>
+          <a:lstStyle/>
+          <a:p>
+            <a:pPr>
+              <a:lnSpc>
+                <a:spcPct val="100000"/>
+              </a:lnSpc>
+            </a:pPr>
+            <a:r>
+              <a:rPr lang="en-US" sz="1800" b="0" strike="noStrike" spc="-1">
+                <a:solidFill>
+                  <a:srgbClr val="0000FF"/>
+                </a:solidFill>
+                <a:latin typeface="Calibri"/>
+              </a:rPr>
+              <a:t>Other package: openxlsx</a:t>
+            </a:r>
+            <a:endParaRPr lang="en-GB" sz="1800" b="0" strike="noStrike" spc="-1">
+              <a:latin typeface="Arial"/>
+            </a:endParaRPr>
+          </a:p>
+        </p:txBody>
+      </p:sp>
+    </p:spTree>
+  </p:cSld>
+  <p:clrMapOvr>
+    <a:masterClrMapping/>
+  </p:clrMapOvr>
+</p:sld>
+</file>
+
+<file path=ppt/slides/slide15.xml><?xml version="1.0" encoding="utf-8"?>
+<p:sld xmlns:a="http://schemas.openxmlformats.org/drawingml/2006/main" xmlns:r="http://schemas.openxmlformats.org/officeDocument/2006/relationships" xmlns:p="http://schemas.openxmlformats.org/presentationml/2006/main">
+  <p:cSld>
+    <p:spTree>
+      <p:nvGrpSpPr>
+        <p:cNvPr id="1" name=""/>
+        <p:cNvGrpSpPr/>
+        <p:nvPr/>
+      </p:nvGrpSpPr>
+      <p:grpSpPr>
+        <a:xfrm>
+          <a:off x="0" y="0"/>
+          <a:ext cx="0" cy="0"/>
+          <a:chOff x="0" y="0"/>
+          <a:chExt cx="0" cy="0"/>
+        </a:xfrm>
+      </p:grpSpPr>
+      <p:sp>
+        <p:nvSpPr>
           <p:cNvPr id="277" name="CustomShape 1"/>
           <p:cNvSpPr/>
           <p:nvPr/>
@@ -24661,7 +25218,7 @@
 </p:sld>
 </file>
 
-<file path=ppt/slides/slide15.xml><?xml version="1.0" encoding="utf-8"?>
+<file path=ppt/slides/slide16.xml><?xml version="1.0" encoding="utf-8"?>
 <p:sld xmlns:a="http://schemas.openxmlformats.org/drawingml/2006/main" xmlns:r="http://schemas.openxmlformats.org/officeDocument/2006/relationships" xmlns:p="http://schemas.openxmlformats.org/presentationml/2006/main">
   <p:cSld>
     <p:spTree>
@@ -25761,7 +26318,7 @@
 </p:sld>
 </file>
 
-<file path=ppt/slides/slide16.xml><?xml version="1.0" encoding="utf-8"?>
+<file path=ppt/slides/slide17.xml><?xml version="1.0" encoding="utf-8"?>
 <p:sld xmlns:a="http://schemas.openxmlformats.org/drawingml/2006/main" xmlns:r="http://schemas.openxmlformats.org/officeDocument/2006/relationships" xmlns:p="http://schemas.openxmlformats.org/presentationml/2006/main">
   <p:cSld>
     <p:spTree>
@@ -28126,7 +28683,7 @@
 </p:sld>
 </file>
 
-<file path=ppt/slides/slide17.xml><?xml version="1.0" encoding="utf-8"?>
+<file path=ppt/slides/slide18.xml><?xml version="1.0" encoding="utf-8"?>
 <p:sld xmlns:a="http://schemas.openxmlformats.org/drawingml/2006/main" xmlns:r="http://schemas.openxmlformats.org/officeDocument/2006/relationships" xmlns:p="http://schemas.openxmlformats.org/presentationml/2006/main">
   <p:cSld>
     <p:spTree>
@@ -33210,7 +33767,7 @@
 </p:sld>
 </file>
 
-<file path=ppt/slides/slide18.xml><?xml version="1.0" encoding="utf-8"?>
+<file path=ppt/slides/slide19.xml><?xml version="1.0" encoding="utf-8"?>
 <p:sld xmlns:a="http://schemas.openxmlformats.org/drawingml/2006/main" xmlns:r="http://schemas.openxmlformats.org/officeDocument/2006/relationships" xmlns:p="http://schemas.openxmlformats.org/presentationml/2006/main">
   <p:cSld>
     <p:spTree>
@@ -33660,7 +34217,175 @@
 </p:sld>
 </file>
 
-<file path=ppt/slides/slide19.xml><?xml version="1.0" encoding="utf-8"?>
+<file path=ppt/slides/slide2.xml><?xml version="1.0" encoding="utf-8"?>
+<p:sld xmlns:a="http://schemas.openxmlformats.org/drawingml/2006/main" xmlns:r="http://schemas.openxmlformats.org/officeDocument/2006/relationships" xmlns:p="http://schemas.openxmlformats.org/presentationml/2006/main">
+  <p:cSld>
+    <p:spTree>
+      <p:nvGrpSpPr>
+        <p:cNvPr id="1" name=""/>
+        <p:cNvGrpSpPr/>
+        <p:nvPr/>
+      </p:nvGrpSpPr>
+      <p:grpSpPr>
+        <a:xfrm>
+          <a:off x="0" y="0"/>
+          <a:ext cx="0" cy="0"/>
+          <a:chOff x="0" y="0"/>
+          <a:chExt cx="0" cy="0"/>
+        </a:xfrm>
+      </p:grpSpPr>
+      <p:sp>
+        <p:nvSpPr>
+          <p:cNvPr id="230" name="CustomShape 1"/>
+          <p:cNvSpPr/>
+          <p:nvPr/>
+        </p:nvSpPr>
+        <p:spPr>
+          <a:xfrm>
+            <a:off x="823320" y="1380240"/>
+            <a:ext cx="7618320" cy="3451680"/>
+          </a:xfrm>
+          <a:prstGeom prst="rect">
+            <a:avLst/>
+          </a:prstGeom>
+          <a:noFill/>
+          <a:ln>
+            <a:noFill/>
+          </a:ln>
+        </p:spPr>
+        <p:style>
+          <a:lnRef idx="0">
+            <a:scrgbClr r="0" g="0" b="0"/>
+          </a:lnRef>
+          <a:fillRef idx="0">
+            <a:scrgbClr r="0" g="0" b="0"/>
+          </a:fillRef>
+          <a:effectRef idx="0">
+            <a:scrgbClr r="0" g="0" b="0"/>
+          </a:effectRef>
+          <a:fontRef idx="minor"/>
+        </p:style>
+        <p:txBody>
+          <a:bodyPr lIns="82800" tIns="41400" rIns="82800" bIns="41400" anchor="ctr">
+            <a:normAutofit/>
+          </a:bodyPr>
+          <a:lstStyle/>
+          <a:p>
+            <a:pPr marL="285840" indent="-284760">
+              <a:lnSpc>
+                <a:spcPct val="100000"/>
+              </a:lnSpc>
+              <a:spcBef>
+                <a:spcPts val="720"/>
+              </a:spcBef>
+              <a:spcAft>
+                <a:spcPts val="544"/>
+              </a:spcAft>
+              <a:buClr>
+                <a:srgbClr val="000000"/>
+              </a:buClr>
+              <a:buSzPct val="80000"/>
+              <a:buFont typeface="Arial"/>
+              <a:buChar char="•"/>
+            </a:pPr>
+            <a:r>
+              <a:rPr lang="en-US" sz="3600" b="0" strike="noStrike" spc="-1" dirty="0">
+                <a:solidFill>
+                  <a:srgbClr val="000000"/>
+                </a:solidFill>
+                <a:latin typeface="Calibri"/>
+                <a:ea typeface="DejaVu Sans"/>
+              </a:rPr>
+              <a:t>GitHub account (optional)</a:t>
+            </a:r>
+          </a:p>
+          <a:p>
+            <a:pPr marL="285840" indent="-284760">
+              <a:lnSpc>
+                <a:spcPct val="100000"/>
+              </a:lnSpc>
+              <a:spcBef>
+                <a:spcPts val="720"/>
+              </a:spcBef>
+              <a:spcAft>
+                <a:spcPts val="544"/>
+              </a:spcAft>
+              <a:buClr>
+                <a:srgbClr val="000000"/>
+              </a:buClr>
+              <a:buSzPct val="80000"/>
+              <a:buFont typeface="Arial"/>
+              <a:buChar char="•"/>
+            </a:pPr>
+            <a:r>
+              <a:rPr lang="en-US" sz="3600" spc="-1" dirty="0">
+                <a:solidFill>
+                  <a:srgbClr val="000000"/>
+                </a:solidFill>
+                <a:latin typeface="Calibri"/>
+              </a:rPr>
+              <a:t>GitHub repository </a:t>
+            </a:r>
+            <a:r>
+              <a:rPr lang="en-US" sz="3600" spc="-1" dirty="0">
+                <a:solidFill>
+                  <a:srgbClr val="000000"/>
+                </a:solidFill>
+                <a:latin typeface="Calibri"/>
+                <a:hlinkClick r:id="rId2"/>
+              </a:rPr>
+              <a:t>https://github.com/sraorao/MSD_R_course_Nov2022</a:t>
+            </a:r>
+            <a:endParaRPr lang="en-US" sz="3600" spc="-1" dirty="0">
+              <a:solidFill>
+                <a:srgbClr val="000000"/>
+              </a:solidFill>
+              <a:latin typeface="Calibri"/>
+            </a:endParaRPr>
+          </a:p>
+          <a:p>
+            <a:pPr marL="285840" indent="-284760">
+              <a:lnSpc>
+                <a:spcPct val="100000"/>
+              </a:lnSpc>
+              <a:spcBef>
+                <a:spcPts val="720"/>
+              </a:spcBef>
+              <a:spcAft>
+                <a:spcPts val="544"/>
+              </a:spcAft>
+              <a:buClr>
+                <a:srgbClr val="000000"/>
+              </a:buClr>
+              <a:buSzPct val="80000"/>
+              <a:buFont typeface="Arial"/>
+              <a:buChar char="•"/>
+            </a:pPr>
+            <a:r>
+              <a:rPr lang="en-US" sz="3600" b="0" strike="noStrike" spc="-1" dirty="0">
+                <a:solidFill>
+                  <a:srgbClr val="000000"/>
+                </a:solidFill>
+                <a:latin typeface="Calibri"/>
+                <a:ea typeface="DejaVu Sans"/>
+              </a:rPr>
+              <a:t>Screen sharing</a:t>
+            </a:r>
+            <a:endParaRPr lang="en-GB" sz="3600" b="0" strike="noStrike" spc="-1" dirty="0">
+              <a:latin typeface="Arial"/>
+            </a:endParaRPr>
+          </a:p>
+        </p:txBody>
+      </p:sp>
+    </p:spTree>
+  </p:cSld>
+  <p:clrMapOvr>
+    <a:masterClrMapping/>
+  </p:clrMapOvr>
+</p:sld>
+</file>
+
+<file path=ppt/slides/slide20.xml><?xml version="1.0" encoding="utf-8"?>
 <p:sld xmlns:a="http://schemas.openxmlformats.org/drawingml/2006/main" xmlns:r="http://schemas.openxmlformats.org/officeDocument/2006/relationships" xmlns:p="http://schemas.openxmlformats.org/presentationml/2006/main">
   <p:cSld>
     <p:spTree>
@@ -38360,175 +39085,7 @@
 </p:sld>
 </file>
 
-<file path=ppt/slides/slide2.xml><?xml version="1.0" encoding="utf-8"?>
-<p:sld xmlns:a="http://schemas.openxmlformats.org/drawingml/2006/main" xmlns:r="http://schemas.openxmlformats.org/officeDocument/2006/relationships" xmlns:p="http://schemas.openxmlformats.org/presentationml/2006/main">
-  <p:cSld>
-    <p:spTree>
-      <p:nvGrpSpPr>
-        <p:cNvPr id="1" name=""/>
-        <p:cNvGrpSpPr/>
-        <p:nvPr/>
-      </p:nvGrpSpPr>
-      <p:grpSpPr>
-        <a:xfrm>
-          <a:off x="0" y="0"/>
-          <a:ext cx="0" cy="0"/>
-          <a:chOff x="0" y="0"/>
-          <a:chExt cx="0" cy="0"/>
-        </a:xfrm>
-      </p:grpSpPr>
-      <p:sp>
-        <p:nvSpPr>
-          <p:cNvPr id="230" name="CustomShape 1"/>
-          <p:cNvSpPr/>
-          <p:nvPr/>
-        </p:nvSpPr>
-        <p:spPr>
-          <a:xfrm>
-            <a:off x="823320" y="1380240"/>
-            <a:ext cx="7618320" cy="3451680"/>
-          </a:xfrm>
-          <a:prstGeom prst="rect">
-            <a:avLst/>
-          </a:prstGeom>
-          <a:noFill/>
-          <a:ln>
-            <a:noFill/>
-          </a:ln>
-        </p:spPr>
-        <p:style>
-          <a:lnRef idx="0">
-            <a:scrgbClr r="0" g="0" b="0"/>
-          </a:lnRef>
-          <a:fillRef idx="0">
-            <a:scrgbClr r="0" g="0" b="0"/>
-          </a:fillRef>
-          <a:effectRef idx="0">
-            <a:scrgbClr r="0" g="0" b="0"/>
-          </a:effectRef>
-          <a:fontRef idx="minor"/>
-        </p:style>
-        <p:txBody>
-          <a:bodyPr lIns="82800" tIns="41400" rIns="82800" bIns="41400" anchor="ctr">
-            <a:normAutofit/>
-          </a:bodyPr>
-          <a:lstStyle/>
-          <a:p>
-            <a:pPr marL="285840" indent="-284760">
-              <a:lnSpc>
-                <a:spcPct val="100000"/>
-              </a:lnSpc>
-              <a:spcBef>
-                <a:spcPts val="720"/>
-              </a:spcBef>
-              <a:spcAft>
-                <a:spcPts val="544"/>
-              </a:spcAft>
-              <a:buClr>
-                <a:srgbClr val="000000"/>
-              </a:buClr>
-              <a:buSzPct val="80000"/>
-              <a:buFont typeface="Arial"/>
-              <a:buChar char="•"/>
-            </a:pPr>
-            <a:r>
-              <a:rPr lang="en-US" sz="3600" b="0" strike="noStrike" spc="-1" dirty="0">
-                <a:solidFill>
-                  <a:srgbClr val="000000"/>
-                </a:solidFill>
-                <a:latin typeface="Calibri"/>
-                <a:ea typeface="DejaVu Sans"/>
-              </a:rPr>
-              <a:t>GitHub account (optional)</a:t>
-            </a:r>
-          </a:p>
-          <a:p>
-            <a:pPr marL="285840" indent="-284760">
-              <a:lnSpc>
-                <a:spcPct val="100000"/>
-              </a:lnSpc>
-              <a:spcBef>
-                <a:spcPts val="720"/>
-              </a:spcBef>
-              <a:spcAft>
-                <a:spcPts val="544"/>
-              </a:spcAft>
-              <a:buClr>
-                <a:srgbClr val="000000"/>
-              </a:buClr>
-              <a:buSzPct val="80000"/>
-              <a:buFont typeface="Arial"/>
-              <a:buChar char="•"/>
-            </a:pPr>
-            <a:r>
-              <a:rPr lang="en-US" sz="3600" spc="-1" dirty="0">
-                <a:solidFill>
-                  <a:srgbClr val="000000"/>
-                </a:solidFill>
-                <a:latin typeface="Calibri"/>
-              </a:rPr>
-              <a:t>GitHub repository </a:t>
-            </a:r>
-            <a:r>
-              <a:rPr lang="en-US" sz="3600" spc="-1" dirty="0">
-                <a:solidFill>
-                  <a:srgbClr val="000000"/>
-                </a:solidFill>
-                <a:latin typeface="Calibri"/>
-                <a:hlinkClick r:id="rId2"/>
-              </a:rPr>
-              <a:t>https://github.com/sraorao/MSD_R_course_Nov2022</a:t>
-            </a:r>
-            <a:endParaRPr lang="en-US" sz="3600" spc="-1" dirty="0">
-              <a:solidFill>
-                <a:srgbClr val="000000"/>
-              </a:solidFill>
-              <a:latin typeface="Calibri"/>
-            </a:endParaRPr>
-          </a:p>
-          <a:p>
-            <a:pPr marL="285840" indent="-284760">
-              <a:lnSpc>
-                <a:spcPct val="100000"/>
-              </a:lnSpc>
-              <a:spcBef>
-                <a:spcPts val="720"/>
-              </a:spcBef>
-              <a:spcAft>
-                <a:spcPts val="544"/>
-              </a:spcAft>
-              <a:buClr>
-                <a:srgbClr val="000000"/>
-              </a:buClr>
-              <a:buSzPct val="80000"/>
-              <a:buFont typeface="Arial"/>
-              <a:buChar char="•"/>
-            </a:pPr>
-            <a:r>
-              <a:rPr lang="en-US" sz="3600" b="0" strike="noStrike" spc="-1" dirty="0">
-                <a:solidFill>
-                  <a:srgbClr val="000000"/>
-                </a:solidFill>
-                <a:latin typeface="Calibri"/>
-                <a:ea typeface="DejaVu Sans"/>
-              </a:rPr>
-              <a:t>Screen sharing</a:t>
-            </a:r>
-            <a:endParaRPr lang="en-GB" sz="3600" b="0" strike="noStrike" spc="-1" dirty="0">
-              <a:latin typeface="Arial"/>
-            </a:endParaRPr>
-          </a:p>
-        </p:txBody>
-      </p:sp>
-    </p:spTree>
-  </p:cSld>
-  <p:clrMapOvr>
-    <a:masterClrMapping/>
-  </p:clrMapOvr>
-</p:sld>
-</file>
-
-<file path=ppt/slides/slide20.xml><?xml version="1.0" encoding="utf-8"?>
+<file path=ppt/slides/slide21.xml><?xml version="1.0" encoding="utf-8"?>
 <p:sld xmlns:a="http://schemas.openxmlformats.org/drawingml/2006/main" xmlns:r="http://schemas.openxmlformats.org/officeDocument/2006/relationships" xmlns:p="http://schemas.openxmlformats.org/presentationml/2006/main">
   <p:cSld>
     <p:bg>
@@ -39062,7 +39619,7 @@
 </p:sld>
 </file>
 
-<file path=ppt/slides/slide21.xml><?xml version="1.0" encoding="utf-8"?>
+<file path=ppt/slides/slide22.xml><?xml version="1.0" encoding="utf-8"?>
 <p:sld xmlns:a="http://schemas.openxmlformats.org/drawingml/2006/main" xmlns:r="http://schemas.openxmlformats.org/officeDocument/2006/relationships" xmlns:p="http://schemas.openxmlformats.org/presentationml/2006/main">
   <p:cSld>
     <p:spTree>
@@ -39557,7 +40114,7 @@
 </p:sld>
 </file>
 
-<file path=ppt/slides/slide22.xml><?xml version="1.0" encoding="utf-8"?>
+<file path=ppt/slides/slide23.xml><?xml version="1.0" encoding="utf-8"?>
 <p:sld xmlns:a="http://schemas.openxmlformats.org/drawingml/2006/main" xmlns:r="http://schemas.openxmlformats.org/officeDocument/2006/relationships" xmlns:p="http://schemas.openxmlformats.org/presentationml/2006/main">
   <p:cSld>
     <p:spTree>
@@ -39974,7 +40531,7 @@
 </p:sld>
 </file>
 
-<file path=ppt/slides/slide23.xml><?xml version="1.0" encoding="utf-8"?>
+<file path=ppt/slides/slide24.xml><?xml version="1.0" encoding="utf-8"?>
 <p:sld xmlns:a="http://schemas.openxmlformats.org/drawingml/2006/main" xmlns:r="http://schemas.openxmlformats.org/officeDocument/2006/relationships" xmlns:p="http://schemas.openxmlformats.org/presentationml/2006/main">
   <p:cSld>
     <p:spTree>
@@ -40828,7 +41385,7 @@
 </p:sld>
 </file>
 
-<file path=ppt/slides/slide24.xml><?xml version="1.0" encoding="utf-8"?>
+<file path=ppt/slides/slide25.xml><?xml version="1.0" encoding="utf-8"?>
 <p:sld xmlns:a="http://schemas.openxmlformats.org/drawingml/2006/main" xmlns:r="http://schemas.openxmlformats.org/officeDocument/2006/relationships" xmlns:p="http://schemas.openxmlformats.org/presentationml/2006/main">
   <p:cSld>
     <p:spTree>
@@ -41213,7 +41770,7 @@
 </p:sld>
 </file>
 
-<file path=ppt/slides/slide25.xml><?xml version="1.0" encoding="utf-8"?>
+<file path=ppt/slides/slide26.xml><?xml version="1.0" encoding="utf-8"?>
 <p:sld xmlns:a="http://schemas.openxmlformats.org/drawingml/2006/main" xmlns:r="http://schemas.openxmlformats.org/officeDocument/2006/relationships" xmlns:p="http://schemas.openxmlformats.org/presentationml/2006/main">
   <p:cSld>
     <p:spTree>
@@ -41672,7 +42229,7 @@
 </p:sld>
 </file>
 
-<file path=ppt/slides/slide26.xml><?xml version="1.0" encoding="utf-8"?>
+<file path=ppt/slides/slide27.xml><?xml version="1.0" encoding="utf-8"?>
 <p:sld xmlns:a="http://schemas.openxmlformats.org/drawingml/2006/main" xmlns:r="http://schemas.openxmlformats.org/officeDocument/2006/relationships" xmlns:p="http://schemas.openxmlformats.org/presentationml/2006/main">
   <p:cSld>
     <p:bg>

</xml_diff>